<commit_message>
Size change to A0
</commit_message>
<xml_diff>
--- a/Poster.pptx
+++ b/Poster.pptx
@@ -2,12 +2,12 @@
 <file path=ppt/presentation.xml><?xml version="1.0" encoding="utf-8"?>
 <p:presentation xmlns:a="http://schemas.openxmlformats.org/drawingml/2006/main" xmlns:r="http://schemas.openxmlformats.org/officeDocument/2006/relationships" xmlns:p="http://schemas.openxmlformats.org/presentationml/2006/main" saveSubsetFonts="1">
   <p:sldMasterIdLst>
-    <p:sldMasterId id="2147483660" r:id="rId1"/>
+    <p:sldMasterId id="2147483684" r:id="rId1"/>
   </p:sldMasterIdLst>
   <p:sldIdLst>
     <p:sldId id="256" r:id="rId2"/>
   </p:sldIdLst>
-  <p:sldSz cx="6858000" cy="12192000"/>
+  <p:sldSz cx="30240288" cy="42767250"/>
   <p:notesSz cx="6858000" cy="9144000"/>
   <p:defaultTextStyle>
     <a:defPPr>
@@ -104,13 +104,18 @@
       </a:defRPr>
     </a:lvl9pPr>
   </p:defaultTextStyle>
+  <p:extLst>
+    <p:ext uri="{EFAFB233-063F-42B5-8137-9DF3F51BA10A}">
+      <p15:sldGuideLst xmlns:p15="http://schemas.microsoft.com/office/powerpoint/2012/main"/>
+    </p:ext>
+  </p:extLst>
 </p:presentation>
 </file>
 
 <file path=ppt/revisionInfo.xml><?xml version="1.0" encoding="utf-8"?>
 <p1510:revInfo xmlns:a="http://schemas.openxmlformats.org/drawingml/2006/main" xmlns:r="http://schemas.openxmlformats.org/officeDocument/2006/relationships" xmlns:p1510="http://schemas.microsoft.com/office/powerpoint/2015/10/main">
   <p1510:revLst>
-    <p1510:client id="{503603CF-D47B-40A0-B37E-5FCD232EB101}" v="1" dt="2023-06-05T09:13:01.007"/>
+    <p1510:client id="{5F09D76C-1841-4F58-94B1-5AE3681891B6}" v="2" dt="2023-06-21T10:45:03.964"/>
   </p1510:revLst>
 </p1510:revInfo>
 </file>
@@ -173,15 +178,15 @@
         </p:nvSpPr>
         <p:spPr>
           <a:xfrm>
-            <a:off x="514350" y="1995312"/>
-            <a:ext cx="5829300" cy="4244622"/>
+            <a:off x="2268022" y="6999180"/>
+            <a:ext cx="25704245" cy="14889339"/>
           </a:xfrm>
         </p:spPr>
         <p:txBody>
           <a:bodyPr anchor="b"/>
           <a:lstStyle>
             <a:lvl1pPr algn="ctr">
-              <a:defRPr sz="4500"/>
+              <a:defRPr sz="19843"/>
             </a:lvl1pPr>
           </a:lstStyle>
           <a:p>
@@ -205,8 +210,8 @@
         </p:nvSpPr>
         <p:spPr>
           <a:xfrm>
-            <a:off x="857250" y="6403623"/>
-            <a:ext cx="5143500" cy="2943577"/>
+            <a:off x="3780036" y="22462709"/>
+            <a:ext cx="22680216" cy="10325516"/>
           </a:xfrm>
         </p:spPr>
         <p:txBody>
@@ -214,39 +219,39 @@
           <a:lstStyle>
             <a:lvl1pPr marL="0" indent="0" algn="ctr">
               <a:buNone/>
-              <a:defRPr sz="1800"/>
+              <a:defRPr sz="7937"/>
             </a:lvl1pPr>
-            <a:lvl2pPr marL="342900" indent="0" algn="ctr">
-              <a:buNone/>
-              <a:defRPr sz="1500"/>
+            <a:lvl2pPr marL="1512006" indent="0" algn="ctr">
+              <a:buNone/>
+              <a:defRPr sz="6614"/>
             </a:lvl2pPr>
-            <a:lvl3pPr marL="685800" indent="0" algn="ctr">
-              <a:buNone/>
-              <a:defRPr sz="1350"/>
+            <a:lvl3pPr marL="3024012" indent="0" algn="ctr">
+              <a:buNone/>
+              <a:defRPr sz="5953"/>
             </a:lvl3pPr>
-            <a:lvl4pPr marL="1028700" indent="0" algn="ctr">
-              <a:buNone/>
-              <a:defRPr sz="1200"/>
+            <a:lvl4pPr marL="4536018" indent="0" algn="ctr">
+              <a:buNone/>
+              <a:defRPr sz="5291"/>
             </a:lvl4pPr>
-            <a:lvl5pPr marL="1371600" indent="0" algn="ctr">
-              <a:buNone/>
-              <a:defRPr sz="1200"/>
+            <a:lvl5pPr marL="6048024" indent="0" algn="ctr">
+              <a:buNone/>
+              <a:defRPr sz="5291"/>
             </a:lvl5pPr>
-            <a:lvl6pPr marL="1714500" indent="0" algn="ctr">
-              <a:buNone/>
-              <a:defRPr sz="1200"/>
+            <a:lvl6pPr marL="7560031" indent="0" algn="ctr">
+              <a:buNone/>
+              <a:defRPr sz="5291"/>
             </a:lvl6pPr>
-            <a:lvl7pPr marL="2057400" indent="0" algn="ctr">
-              <a:buNone/>
-              <a:defRPr sz="1200"/>
+            <a:lvl7pPr marL="9072037" indent="0" algn="ctr">
+              <a:buNone/>
+              <a:defRPr sz="5291"/>
             </a:lvl7pPr>
-            <a:lvl8pPr marL="2400300" indent="0" algn="ctr">
-              <a:buNone/>
-              <a:defRPr sz="1200"/>
+            <a:lvl8pPr marL="10584043" indent="0" algn="ctr">
+              <a:buNone/>
+              <a:defRPr sz="5291"/>
             </a:lvl8pPr>
-            <a:lvl9pPr marL="2743200" indent="0" algn="ctr">
-              <a:buNone/>
-              <a:defRPr sz="1200"/>
+            <a:lvl9pPr marL="12096049" indent="0" algn="ctr">
+              <a:buNone/>
+              <a:defRPr sz="5291"/>
             </a:lvl9pPr>
           </a:lstStyle>
           <a:p>
@@ -275,7 +280,7 @@
           <a:p>
             <a:fld id="{B8089D90-E8EC-433F-8241-FB36479BB3A8}" type="datetimeFigureOut">
               <a:rPr lang="en-NL" smtClean="0"/>
-              <a:t>05/06/2023</a:t>
+              <a:t>21/06/2023</a:t>
             </a:fld>
             <a:endParaRPr lang="en-NL"/>
           </a:p>
@@ -326,7 +331,7 @@
     </p:spTree>
     <p:extLst>
       <p:ext uri="{BB962C8B-B14F-4D97-AF65-F5344CB8AC3E}">
-        <p14:creationId xmlns:p14="http://schemas.microsoft.com/office/powerpoint/2010/main" val="4202025576"/>
+        <p14:creationId xmlns:p14="http://schemas.microsoft.com/office/powerpoint/2010/main" val="1216960784"/>
       </p:ext>
     </p:extLst>
   </p:cSld>
@@ -445,7 +450,7 @@
           <a:p>
             <a:fld id="{B8089D90-E8EC-433F-8241-FB36479BB3A8}" type="datetimeFigureOut">
               <a:rPr lang="en-NL" smtClean="0"/>
-              <a:t>05/06/2023</a:t>
+              <a:t>21/06/2023</a:t>
             </a:fld>
             <a:endParaRPr lang="en-NL"/>
           </a:p>
@@ -496,7 +501,7 @@
     </p:spTree>
     <p:extLst>
       <p:ext uri="{BB962C8B-B14F-4D97-AF65-F5344CB8AC3E}">
-        <p14:creationId xmlns:p14="http://schemas.microsoft.com/office/powerpoint/2010/main" val="2809444958"/>
+        <p14:creationId xmlns:p14="http://schemas.microsoft.com/office/powerpoint/2010/main" val="150836630"/>
       </p:ext>
     </p:extLst>
   </p:cSld>
@@ -535,8 +540,8 @@
         </p:nvSpPr>
         <p:spPr>
           <a:xfrm>
-            <a:off x="4907757" y="649111"/>
-            <a:ext cx="1478756" cy="10332156"/>
+            <a:off x="21640708" y="2276960"/>
+            <a:ext cx="6520562" cy="36243268"/>
           </a:xfrm>
         </p:spPr>
         <p:txBody>
@@ -563,8 +568,8 @@
         </p:nvSpPr>
         <p:spPr>
           <a:xfrm>
-            <a:off x="471488" y="649111"/>
-            <a:ext cx="4350544" cy="10332156"/>
+            <a:off x="2079021" y="2276960"/>
+            <a:ext cx="19183683" cy="36243268"/>
           </a:xfrm>
         </p:spPr>
         <p:txBody>
@@ -625,7 +630,7 @@
           <a:p>
             <a:fld id="{B8089D90-E8EC-433F-8241-FB36479BB3A8}" type="datetimeFigureOut">
               <a:rPr lang="en-NL" smtClean="0"/>
-              <a:t>05/06/2023</a:t>
+              <a:t>21/06/2023</a:t>
             </a:fld>
             <a:endParaRPr lang="en-NL"/>
           </a:p>
@@ -676,7 +681,7 @@
     </p:spTree>
     <p:extLst>
       <p:ext uri="{BB962C8B-B14F-4D97-AF65-F5344CB8AC3E}">
-        <p14:creationId xmlns:p14="http://schemas.microsoft.com/office/powerpoint/2010/main" val="1006203623"/>
+        <p14:creationId xmlns:p14="http://schemas.microsoft.com/office/powerpoint/2010/main" val="1796651024"/>
       </p:ext>
     </p:extLst>
   </p:cSld>
@@ -795,7 +800,7 @@
           <a:p>
             <a:fld id="{B8089D90-E8EC-433F-8241-FB36479BB3A8}" type="datetimeFigureOut">
               <a:rPr lang="en-NL" smtClean="0"/>
-              <a:t>05/06/2023</a:t>
+              <a:t>21/06/2023</a:t>
             </a:fld>
             <a:endParaRPr lang="en-NL"/>
           </a:p>
@@ -846,7 +851,7 @@
     </p:spTree>
     <p:extLst>
       <p:ext uri="{BB962C8B-B14F-4D97-AF65-F5344CB8AC3E}">
-        <p14:creationId xmlns:p14="http://schemas.microsoft.com/office/powerpoint/2010/main" val="3088679248"/>
+        <p14:creationId xmlns:p14="http://schemas.microsoft.com/office/powerpoint/2010/main" val="2060888008"/>
       </p:ext>
     </p:extLst>
   </p:cSld>
@@ -885,15 +890,15 @@
         </p:nvSpPr>
         <p:spPr>
           <a:xfrm>
-            <a:off x="467916" y="3039537"/>
-            <a:ext cx="5915025" cy="5071532"/>
+            <a:off x="2063272" y="10662125"/>
+            <a:ext cx="26082248" cy="17789985"/>
           </a:xfrm>
         </p:spPr>
         <p:txBody>
           <a:bodyPr anchor="b"/>
           <a:lstStyle>
             <a:lvl1pPr>
-              <a:defRPr sz="4500"/>
+              <a:defRPr sz="19843"/>
             </a:lvl1pPr>
           </a:lstStyle>
           <a:p>
@@ -917,8 +922,8 @@
         </p:nvSpPr>
         <p:spPr>
           <a:xfrm>
-            <a:off x="467916" y="8159048"/>
-            <a:ext cx="5915025" cy="2666999"/>
+            <a:off x="2063272" y="28620410"/>
+            <a:ext cx="26082248" cy="9355333"/>
           </a:xfrm>
         </p:spPr>
         <p:txBody>
@@ -926,15 +931,15 @@
           <a:lstStyle>
             <a:lvl1pPr marL="0" indent="0">
               <a:buNone/>
-              <a:defRPr sz="1800">
+              <a:defRPr sz="7937">
                 <a:solidFill>
                   <a:schemeClr val="tx1"/>
                 </a:solidFill>
               </a:defRPr>
             </a:lvl1pPr>
-            <a:lvl2pPr marL="342900" indent="0">
-              <a:buNone/>
-              <a:defRPr sz="1500">
+            <a:lvl2pPr marL="1512006" indent="0">
+              <a:buNone/>
+              <a:defRPr sz="6614">
                 <a:solidFill>
                   <a:schemeClr val="tx1">
                     <a:tint val="75000"/>
@@ -942,9 +947,9 @@
                 </a:solidFill>
               </a:defRPr>
             </a:lvl2pPr>
-            <a:lvl3pPr marL="685800" indent="0">
-              <a:buNone/>
-              <a:defRPr sz="1350">
+            <a:lvl3pPr marL="3024012" indent="0">
+              <a:buNone/>
+              <a:defRPr sz="5953">
                 <a:solidFill>
                   <a:schemeClr val="tx1">
                     <a:tint val="75000"/>
@@ -952,9 +957,9 @@
                 </a:solidFill>
               </a:defRPr>
             </a:lvl3pPr>
-            <a:lvl4pPr marL="1028700" indent="0">
-              <a:buNone/>
-              <a:defRPr sz="1200">
+            <a:lvl4pPr marL="4536018" indent="0">
+              <a:buNone/>
+              <a:defRPr sz="5291">
                 <a:solidFill>
                   <a:schemeClr val="tx1">
                     <a:tint val="75000"/>
@@ -962,9 +967,9 @@
                 </a:solidFill>
               </a:defRPr>
             </a:lvl4pPr>
-            <a:lvl5pPr marL="1371600" indent="0">
-              <a:buNone/>
-              <a:defRPr sz="1200">
+            <a:lvl5pPr marL="6048024" indent="0">
+              <a:buNone/>
+              <a:defRPr sz="5291">
                 <a:solidFill>
                   <a:schemeClr val="tx1">
                     <a:tint val="75000"/>
@@ -972,9 +977,9 @@
                 </a:solidFill>
               </a:defRPr>
             </a:lvl5pPr>
-            <a:lvl6pPr marL="1714500" indent="0">
-              <a:buNone/>
-              <a:defRPr sz="1200">
+            <a:lvl6pPr marL="7560031" indent="0">
+              <a:buNone/>
+              <a:defRPr sz="5291">
                 <a:solidFill>
                   <a:schemeClr val="tx1">
                     <a:tint val="75000"/>
@@ -982,9 +987,9 @@
                 </a:solidFill>
               </a:defRPr>
             </a:lvl6pPr>
-            <a:lvl7pPr marL="2057400" indent="0">
-              <a:buNone/>
-              <a:defRPr sz="1200">
+            <a:lvl7pPr marL="9072037" indent="0">
+              <a:buNone/>
+              <a:defRPr sz="5291">
                 <a:solidFill>
                   <a:schemeClr val="tx1">
                     <a:tint val="75000"/>
@@ -992,9 +997,9 @@
                 </a:solidFill>
               </a:defRPr>
             </a:lvl7pPr>
-            <a:lvl8pPr marL="2400300" indent="0">
-              <a:buNone/>
-              <a:defRPr sz="1200">
+            <a:lvl8pPr marL="10584043" indent="0">
+              <a:buNone/>
+              <a:defRPr sz="5291">
                 <a:solidFill>
                   <a:schemeClr val="tx1">
                     <a:tint val="75000"/>
@@ -1002,9 +1007,9 @@
                 </a:solidFill>
               </a:defRPr>
             </a:lvl8pPr>
-            <a:lvl9pPr marL="2743200" indent="0">
-              <a:buNone/>
-              <a:defRPr sz="1200">
+            <a:lvl9pPr marL="12096049" indent="0">
+              <a:buNone/>
+              <a:defRPr sz="5291">
                 <a:solidFill>
                   <a:schemeClr val="tx1">
                     <a:tint val="75000"/>
@@ -1039,7 +1044,7 @@
           <a:p>
             <a:fld id="{B8089D90-E8EC-433F-8241-FB36479BB3A8}" type="datetimeFigureOut">
               <a:rPr lang="en-NL" smtClean="0"/>
-              <a:t>05/06/2023</a:t>
+              <a:t>21/06/2023</a:t>
             </a:fld>
             <a:endParaRPr lang="en-NL"/>
           </a:p>
@@ -1090,7 +1095,7 @@
     </p:spTree>
     <p:extLst>
       <p:ext uri="{BB962C8B-B14F-4D97-AF65-F5344CB8AC3E}">
-        <p14:creationId xmlns:p14="http://schemas.microsoft.com/office/powerpoint/2010/main" val="457526537"/>
+        <p14:creationId xmlns:p14="http://schemas.microsoft.com/office/powerpoint/2010/main" val="3226967259"/>
       </p:ext>
     </p:extLst>
   </p:cSld>
@@ -1152,8 +1157,8 @@
         </p:nvSpPr>
         <p:spPr>
           <a:xfrm>
-            <a:off x="471488" y="3245556"/>
-            <a:ext cx="2914650" cy="7735712"/>
+            <a:off x="2079020" y="11384800"/>
+            <a:ext cx="12852122" cy="27135427"/>
           </a:xfrm>
         </p:spPr>
         <p:txBody>
@@ -1209,8 +1214,8 @@
         </p:nvSpPr>
         <p:spPr>
           <a:xfrm>
-            <a:off x="3471863" y="3245556"/>
-            <a:ext cx="2914650" cy="7735712"/>
+            <a:off x="15309146" y="11384800"/>
+            <a:ext cx="12852122" cy="27135427"/>
           </a:xfrm>
         </p:spPr>
         <p:txBody>
@@ -1271,7 +1276,7 @@
           <a:p>
             <a:fld id="{B8089D90-E8EC-433F-8241-FB36479BB3A8}" type="datetimeFigureOut">
               <a:rPr lang="en-NL" smtClean="0"/>
-              <a:t>05/06/2023</a:t>
+              <a:t>21/06/2023</a:t>
             </a:fld>
             <a:endParaRPr lang="en-NL"/>
           </a:p>
@@ -1322,7 +1327,7 @@
     </p:spTree>
     <p:extLst>
       <p:ext uri="{BB962C8B-B14F-4D97-AF65-F5344CB8AC3E}">
-        <p14:creationId xmlns:p14="http://schemas.microsoft.com/office/powerpoint/2010/main" val="991564536"/>
+        <p14:creationId xmlns:p14="http://schemas.microsoft.com/office/powerpoint/2010/main" val="1315376767"/>
       </p:ext>
     </p:extLst>
   </p:cSld>
@@ -1361,8 +1366,8 @@
         </p:nvSpPr>
         <p:spPr>
           <a:xfrm>
-            <a:off x="472381" y="649114"/>
-            <a:ext cx="5915025" cy="2356556"/>
+            <a:off x="2082959" y="2276970"/>
+            <a:ext cx="26082248" cy="8266358"/>
           </a:xfrm>
         </p:spPr>
         <p:txBody>
@@ -1389,8 +1394,8 @@
         </p:nvSpPr>
         <p:spPr>
           <a:xfrm>
-            <a:off x="472381" y="2988734"/>
-            <a:ext cx="2901255" cy="1464732"/>
+            <a:off x="2082962" y="10483919"/>
+            <a:ext cx="12793057" cy="5138007"/>
           </a:xfrm>
         </p:spPr>
         <p:txBody>
@@ -1398,39 +1403,39 @@
           <a:lstStyle>
             <a:lvl1pPr marL="0" indent="0">
               <a:buNone/>
-              <a:defRPr sz="1800" b="1"/>
+              <a:defRPr sz="7937" b="1"/>
             </a:lvl1pPr>
-            <a:lvl2pPr marL="342900" indent="0">
-              <a:buNone/>
-              <a:defRPr sz="1500" b="1"/>
+            <a:lvl2pPr marL="1512006" indent="0">
+              <a:buNone/>
+              <a:defRPr sz="6614" b="1"/>
             </a:lvl2pPr>
-            <a:lvl3pPr marL="685800" indent="0">
-              <a:buNone/>
-              <a:defRPr sz="1350" b="1"/>
+            <a:lvl3pPr marL="3024012" indent="0">
+              <a:buNone/>
+              <a:defRPr sz="5953" b="1"/>
             </a:lvl3pPr>
-            <a:lvl4pPr marL="1028700" indent="0">
-              <a:buNone/>
-              <a:defRPr sz="1200" b="1"/>
+            <a:lvl4pPr marL="4536018" indent="0">
+              <a:buNone/>
+              <a:defRPr sz="5291" b="1"/>
             </a:lvl4pPr>
-            <a:lvl5pPr marL="1371600" indent="0">
-              <a:buNone/>
-              <a:defRPr sz="1200" b="1"/>
+            <a:lvl5pPr marL="6048024" indent="0">
+              <a:buNone/>
+              <a:defRPr sz="5291" b="1"/>
             </a:lvl5pPr>
-            <a:lvl6pPr marL="1714500" indent="0">
-              <a:buNone/>
-              <a:defRPr sz="1200" b="1"/>
+            <a:lvl6pPr marL="7560031" indent="0">
+              <a:buNone/>
+              <a:defRPr sz="5291" b="1"/>
             </a:lvl6pPr>
-            <a:lvl7pPr marL="2057400" indent="0">
-              <a:buNone/>
-              <a:defRPr sz="1200" b="1"/>
+            <a:lvl7pPr marL="9072037" indent="0">
+              <a:buNone/>
+              <a:defRPr sz="5291" b="1"/>
             </a:lvl7pPr>
-            <a:lvl8pPr marL="2400300" indent="0">
-              <a:buNone/>
-              <a:defRPr sz="1200" b="1"/>
+            <a:lvl8pPr marL="10584043" indent="0">
+              <a:buNone/>
+              <a:defRPr sz="5291" b="1"/>
             </a:lvl8pPr>
-            <a:lvl9pPr marL="2743200" indent="0">
-              <a:buNone/>
-              <a:defRPr sz="1200" b="1"/>
+            <a:lvl9pPr marL="12096049" indent="0">
+              <a:buNone/>
+              <a:defRPr sz="5291" b="1"/>
             </a:lvl9pPr>
           </a:lstStyle>
           <a:p>
@@ -1454,8 +1459,8 @@
         </p:nvSpPr>
         <p:spPr>
           <a:xfrm>
-            <a:off x="472381" y="4453467"/>
-            <a:ext cx="2901255" cy="6550379"/>
+            <a:off x="2082962" y="15621926"/>
+            <a:ext cx="12793057" cy="22977500"/>
           </a:xfrm>
         </p:spPr>
         <p:txBody>
@@ -1511,8 +1516,8 @@
         </p:nvSpPr>
         <p:spPr>
           <a:xfrm>
-            <a:off x="3471863" y="2988734"/>
-            <a:ext cx="2915543" cy="1464732"/>
+            <a:off x="15309148" y="10483919"/>
+            <a:ext cx="12856061" cy="5138007"/>
           </a:xfrm>
         </p:spPr>
         <p:txBody>
@@ -1520,39 +1525,39 @@
           <a:lstStyle>
             <a:lvl1pPr marL="0" indent="0">
               <a:buNone/>
-              <a:defRPr sz="1800" b="1"/>
+              <a:defRPr sz="7937" b="1"/>
             </a:lvl1pPr>
-            <a:lvl2pPr marL="342900" indent="0">
-              <a:buNone/>
-              <a:defRPr sz="1500" b="1"/>
+            <a:lvl2pPr marL="1512006" indent="0">
+              <a:buNone/>
+              <a:defRPr sz="6614" b="1"/>
             </a:lvl2pPr>
-            <a:lvl3pPr marL="685800" indent="0">
-              <a:buNone/>
-              <a:defRPr sz="1350" b="1"/>
+            <a:lvl3pPr marL="3024012" indent="0">
+              <a:buNone/>
+              <a:defRPr sz="5953" b="1"/>
             </a:lvl3pPr>
-            <a:lvl4pPr marL="1028700" indent="0">
-              <a:buNone/>
-              <a:defRPr sz="1200" b="1"/>
+            <a:lvl4pPr marL="4536018" indent="0">
+              <a:buNone/>
+              <a:defRPr sz="5291" b="1"/>
             </a:lvl4pPr>
-            <a:lvl5pPr marL="1371600" indent="0">
-              <a:buNone/>
-              <a:defRPr sz="1200" b="1"/>
+            <a:lvl5pPr marL="6048024" indent="0">
+              <a:buNone/>
+              <a:defRPr sz="5291" b="1"/>
             </a:lvl5pPr>
-            <a:lvl6pPr marL="1714500" indent="0">
-              <a:buNone/>
-              <a:defRPr sz="1200" b="1"/>
+            <a:lvl6pPr marL="7560031" indent="0">
+              <a:buNone/>
+              <a:defRPr sz="5291" b="1"/>
             </a:lvl6pPr>
-            <a:lvl7pPr marL="2057400" indent="0">
-              <a:buNone/>
-              <a:defRPr sz="1200" b="1"/>
+            <a:lvl7pPr marL="9072037" indent="0">
+              <a:buNone/>
+              <a:defRPr sz="5291" b="1"/>
             </a:lvl7pPr>
-            <a:lvl8pPr marL="2400300" indent="0">
-              <a:buNone/>
-              <a:defRPr sz="1200" b="1"/>
+            <a:lvl8pPr marL="10584043" indent="0">
+              <a:buNone/>
+              <a:defRPr sz="5291" b="1"/>
             </a:lvl8pPr>
-            <a:lvl9pPr marL="2743200" indent="0">
-              <a:buNone/>
-              <a:defRPr sz="1200" b="1"/>
+            <a:lvl9pPr marL="12096049" indent="0">
+              <a:buNone/>
+              <a:defRPr sz="5291" b="1"/>
             </a:lvl9pPr>
           </a:lstStyle>
           <a:p>
@@ -1576,8 +1581,8 @@
         </p:nvSpPr>
         <p:spPr>
           <a:xfrm>
-            <a:off x="3471863" y="4453467"/>
-            <a:ext cx="2915543" cy="6550379"/>
+            <a:off x="15309148" y="15621926"/>
+            <a:ext cx="12856061" cy="22977500"/>
           </a:xfrm>
         </p:spPr>
         <p:txBody>
@@ -1638,7 +1643,7 @@
           <a:p>
             <a:fld id="{B8089D90-E8EC-433F-8241-FB36479BB3A8}" type="datetimeFigureOut">
               <a:rPr lang="en-NL" smtClean="0"/>
-              <a:t>05/06/2023</a:t>
+              <a:t>21/06/2023</a:t>
             </a:fld>
             <a:endParaRPr lang="en-NL"/>
           </a:p>
@@ -1689,7 +1694,7 @@
     </p:spTree>
     <p:extLst>
       <p:ext uri="{BB962C8B-B14F-4D97-AF65-F5344CB8AC3E}">
-        <p14:creationId xmlns:p14="http://schemas.microsoft.com/office/powerpoint/2010/main" val="3190188667"/>
+        <p14:creationId xmlns:p14="http://schemas.microsoft.com/office/powerpoint/2010/main" val="274705922"/>
       </p:ext>
     </p:extLst>
   </p:cSld>
@@ -1756,7 +1761,7 @@
           <a:p>
             <a:fld id="{B8089D90-E8EC-433F-8241-FB36479BB3A8}" type="datetimeFigureOut">
               <a:rPr lang="en-NL" smtClean="0"/>
-              <a:t>05/06/2023</a:t>
+              <a:t>21/06/2023</a:t>
             </a:fld>
             <a:endParaRPr lang="en-NL"/>
           </a:p>
@@ -1807,7 +1812,7 @@
     </p:spTree>
     <p:extLst>
       <p:ext uri="{BB962C8B-B14F-4D97-AF65-F5344CB8AC3E}">
-        <p14:creationId xmlns:p14="http://schemas.microsoft.com/office/powerpoint/2010/main" val="1301362767"/>
+        <p14:creationId xmlns:p14="http://schemas.microsoft.com/office/powerpoint/2010/main" val="1576448981"/>
       </p:ext>
     </p:extLst>
   </p:cSld>
@@ -1851,7 +1856,7 @@
           <a:p>
             <a:fld id="{B8089D90-E8EC-433F-8241-FB36479BB3A8}" type="datetimeFigureOut">
               <a:rPr lang="en-NL" smtClean="0"/>
-              <a:t>05/06/2023</a:t>
+              <a:t>21/06/2023</a:t>
             </a:fld>
             <a:endParaRPr lang="en-NL"/>
           </a:p>
@@ -1902,7 +1907,7 @@
     </p:spTree>
     <p:extLst>
       <p:ext uri="{BB962C8B-B14F-4D97-AF65-F5344CB8AC3E}">
-        <p14:creationId xmlns:p14="http://schemas.microsoft.com/office/powerpoint/2010/main" val="862736341"/>
+        <p14:creationId xmlns:p14="http://schemas.microsoft.com/office/powerpoint/2010/main" val="2646187575"/>
       </p:ext>
     </p:extLst>
   </p:cSld>
@@ -1941,15 +1946,15 @@
         </p:nvSpPr>
         <p:spPr>
           <a:xfrm>
-            <a:off x="472381" y="812800"/>
-            <a:ext cx="2211884" cy="2844800"/>
+            <a:off x="2082959" y="2851150"/>
+            <a:ext cx="9753280" cy="9979025"/>
           </a:xfrm>
         </p:spPr>
         <p:txBody>
           <a:bodyPr anchor="b"/>
           <a:lstStyle>
             <a:lvl1pPr>
-              <a:defRPr sz="2400"/>
+              <a:defRPr sz="10583"/>
             </a:lvl1pPr>
           </a:lstStyle>
           <a:p>
@@ -1973,39 +1978,39 @@
         </p:nvSpPr>
         <p:spPr>
           <a:xfrm>
-            <a:off x="2915543" y="1755425"/>
-            <a:ext cx="3471863" cy="8664222"/>
+            <a:off x="12856061" y="6157701"/>
+            <a:ext cx="15309146" cy="30392467"/>
           </a:xfrm>
         </p:spPr>
         <p:txBody>
           <a:bodyPr/>
           <a:lstStyle>
             <a:lvl1pPr>
-              <a:defRPr sz="2400"/>
+              <a:defRPr sz="10583"/>
             </a:lvl1pPr>
             <a:lvl2pPr>
-              <a:defRPr sz="2100"/>
+              <a:defRPr sz="9260"/>
             </a:lvl2pPr>
             <a:lvl3pPr>
-              <a:defRPr sz="1800"/>
+              <a:defRPr sz="7937"/>
             </a:lvl3pPr>
             <a:lvl4pPr>
-              <a:defRPr sz="1500"/>
+              <a:defRPr sz="6614"/>
             </a:lvl4pPr>
             <a:lvl5pPr>
-              <a:defRPr sz="1500"/>
+              <a:defRPr sz="6614"/>
             </a:lvl5pPr>
             <a:lvl6pPr>
-              <a:defRPr sz="1500"/>
+              <a:defRPr sz="6614"/>
             </a:lvl6pPr>
             <a:lvl7pPr>
-              <a:defRPr sz="1500"/>
+              <a:defRPr sz="6614"/>
             </a:lvl7pPr>
             <a:lvl8pPr>
-              <a:defRPr sz="1500"/>
+              <a:defRPr sz="6614"/>
             </a:lvl8pPr>
             <a:lvl9pPr>
-              <a:defRPr sz="1500"/>
+              <a:defRPr sz="6614"/>
             </a:lvl9pPr>
           </a:lstStyle>
           <a:p>
@@ -2058,8 +2063,8 @@
         </p:nvSpPr>
         <p:spPr>
           <a:xfrm>
-            <a:off x="472381" y="3657600"/>
-            <a:ext cx="2211884" cy="6776156"/>
+            <a:off x="2082959" y="12830175"/>
+            <a:ext cx="9753280" cy="23769486"/>
           </a:xfrm>
         </p:spPr>
         <p:txBody>
@@ -2067,39 +2072,39 @@
           <a:lstStyle>
             <a:lvl1pPr marL="0" indent="0">
               <a:buNone/>
-              <a:defRPr sz="1200"/>
+              <a:defRPr sz="5291"/>
             </a:lvl1pPr>
-            <a:lvl2pPr marL="342900" indent="0">
-              <a:buNone/>
-              <a:defRPr sz="1050"/>
+            <a:lvl2pPr marL="1512006" indent="0">
+              <a:buNone/>
+              <a:defRPr sz="4630"/>
             </a:lvl2pPr>
-            <a:lvl3pPr marL="685800" indent="0">
-              <a:buNone/>
-              <a:defRPr sz="900"/>
+            <a:lvl3pPr marL="3024012" indent="0">
+              <a:buNone/>
+              <a:defRPr sz="3969"/>
             </a:lvl3pPr>
-            <a:lvl4pPr marL="1028700" indent="0">
-              <a:buNone/>
-              <a:defRPr sz="750"/>
+            <a:lvl4pPr marL="4536018" indent="0">
+              <a:buNone/>
+              <a:defRPr sz="3307"/>
             </a:lvl4pPr>
-            <a:lvl5pPr marL="1371600" indent="0">
-              <a:buNone/>
-              <a:defRPr sz="750"/>
+            <a:lvl5pPr marL="6048024" indent="0">
+              <a:buNone/>
+              <a:defRPr sz="3307"/>
             </a:lvl5pPr>
-            <a:lvl6pPr marL="1714500" indent="0">
-              <a:buNone/>
-              <a:defRPr sz="750"/>
+            <a:lvl6pPr marL="7560031" indent="0">
+              <a:buNone/>
+              <a:defRPr sz="3307"/>
             </a:lvl6pPr>
-            <a:lvl7pPr marL="2057400" indent="0">
-              <a:buNone/>
-              <a:defRPr sz="750"/>
+            <a:lvl7pPr marL="9072037" indent="0">
+              <a:buNone/>
+              <a:defRPr sz="3307"/>
             </a:lvl7pPr>
-            <a:lvl8pPr marL="2400300" indent="0">
-              <a:buNone/>
-              <a:defRPr sz="750"/>
+            <a:lvl8pPr marL="10584043" indent="0">
+              <a:buNone/>
+              <a:defRPr sz="3307"/>
             </a:lvl8pPr>
-            <a:lvl9pPr marL="2743200" indent="0">
-              <a:buNone/>
-              <a:defRPr sz="750"/>
+            <a:lvl9pPr marL="12096049" indent="0">
+              <a:buNone/>
+              <a:defRPr sz="3307"/>
             </a:lvl9pPr>
           </a:lstStyle>
           <a:p>
@@ -2128,7 +2133,7 @@
           <a:p>
             <a:fld id="{B8089D90-E8EC-433F-8241-FB36479BB3A8}" type="datetimeFigureOut">
               <a:rPr lang="en-NL" smtClean="0"/>
-              <a:t>05/06/2023</a:t>
+              <a:t>21/06/2023</a:t>
             </a:fld>
             <a:endParaRPr lang="en-NL"/>
           </a:p>
@@ -2179,7 +2184,7 @@
     </p:spTree>
     <p:extLst>
       <p:ext uri="{BB962C8B-B14F-4D97-AF65-F5344CB8AC3E}">
-        <p14:creationId xmlns:p14="http://schemas.microsoft.com/office/powerpoint/2010/main" val="2630396387"/>
+        <p14:creationId xmlns:p14="http://schemas.microsoft.com/office/powerpoint/2010/main" val="2691020940"/>
       </p:ext>
     </p:extLst>
   </p:cSld>
@@ -2218,15 +2223,15 @@
         </p:nvSpPr>
         <p:spPr>
           <a:xfrm>
-            <a:off x="472381" y="812800"/>
-            <a:ext cx="2211884" cy="2844800"/>
+            <a:off x="2082959" y="2851150"/>
+            <a:ext cx="9753280" cy="9979025"/>
           </a:xfrm>
         </p:spPr>
         <p:txBody>
           <a:bodyPr anchor="b"/>
           <a:lstStyle>
             <a:lvl1pPr>
-              <a:defRPr sz="2400"/>
+              <a:defRPr sz="10583"/>
             </a:lvl1pPr>
           </a:lstStyle>
           <a:p>
@@ -2250,8 +2255,8 @@
         </p:nvSpPr>
         <p:spPr>
           <a:xfrm>
-            <a:off x="2915543" y="1755425"/>
-            <a:ext cx="3471863" cy="8664222"/>
+            <a:off x="12856061" y="6157701"/>
+            <a:ext cx="15309146" cy="30392467"/>
           </a:xfrm>
         </p:spPr>
         <p:txBody>
@@ -2259,39 +2264,39 @@
           <a:lstStyle>
             <a:lvl1pPr marL="0" indent="0">
               <a:buNone/>
-              <a:defRPr sz="2400"/>
+              <a:defRPr sz="10583"/>
             </a:lvl1pPr>
-            <a:lvl2pPr marL="342900" indent="0">
-              <a:buNone/>
-              <a:defRPr sz="2100"/>
+            <a:lvl2pPr marL="1512006" indent="0">
+              <a:buNone/>
+              <a:defRPr sz="9260"/>
             </a:lvl2pPr>
-            <a:lvl3pPr marL="685800" indent="0">
-              <a:buNone/>
-              <a:defRPr sz="1800"/>
+            <a:lvl3pPr marL="3024012" indent="0">
+              <a:buNone/>
+              <a:defRPr sz="7937"/>
             </a:lvl3pPr>
-            <a:lvl4pPr marL="1028700" indent="0">
-              <a:buNone/>
-              <a:defRPr sz="1500"/>
+            <a:lvl4pPr marL="4536018" indent="0">
+              <a:buNone/>
+              <a:defRPr sz="6614"/>
             </a:lvl4pPr>
-            <a:lvl5pPr marL="1371600" indent="0">
-              <a:buNone/>
-              <a:defRPr sz="1500"/>
+            <a:lvl5pPr marL="6048024" indent="0">
+              <a:buNone/>
+              <a:defRPr sz="6614"/>
             </a:lvl5pPr>
-            <a:lvl6pPr marL="1714500" indent="0">
-              <a:buNone/>
-              <a:defRPr sz="1500"/>
+            <a:lvl6pPr marL="7560031" indent="0">
+              <a:buNone/>
+              <a:defRPr sz="6614"/>
             </a:lvl6pPr>
-            <a:lvl7pPr marL="2057400" indent="0">
-              <a:buNone/>
-              <a:defRPr sz="1500"/>
+            <a:lvl7pPr marL="9072037" indent="0">
+              <a:buNone/>
+              <a:defRPr sz="6614"/>
             </a:lvl7pPr>
-            <a:lvl8pPr marL="2400300" indent="0">
-              <a:buNone/>
-              <a:defRPr sz="1500"/>
+            <a:lvl8pPr marL="10584043" indent="0">
+              <a:buNone/>
+              <a:defRPr sz="6614"/>
             </a:lvl8pPr>
-            <a:lvl9pPr marL="2743200" indent="0">
-              <a:buNone/>
-              <a:defRPr sz="1500"/>
+            <a:lvl9pPr marL="12096049" indent="0">
+              <a:buNone/>
+              <a:defRPr sz="6614"/>
             </a:lvl9pPr>
           </a:lstStyle>
           <a:p>
@@ -2315,8 +2320,8 @@
         </p:nvSpPr>
         <p:spPr>
           <a:xfrm>
-            <a:off x="472381" y="3657600"/>
-            <a:ext cx="2211884" cy="6776156"/>
+            <a:off x="2082959" y="12830175"/>
+            <a:ext cx="9753280" cy="23769486"/>
           </a:xfrm>
         </p:spPr>
         <p:txBody>
@@ -2324,39 +2329,39 @@
           <a:lstStyle>
             <a:lvl1pPr marL="0" indent="0">
               <a:buNone/>
-              <a:defRPr sz="1200"/>
+              <a:defRPr sz="5291"/>
             </a:lvl1pPr>
-            <a:lvl2pPr marL="342900" indent="0">
-              <a:buNone/>
-              <a:defRPr sz="1050"/>
+            <a:lvl2pPr marL="1512006" indent="0">
+              <a:buNone/>
+              <a:defRPr sz="4630"/>
             </a:lvl2pPr>
-            <a:lvl3pPr marL="685800" indent="0">
-              <a:buNone/>
-              <a:defRPr sz="900"/>
+            <a:lvl3pPr marL="3024012" indent="0">
+              <a:buNone/>
+              <a:defRPr sz="3969"/>
             </a:lvl3pPr>
-            <a:lvl4pPr marL="1028700" indent="0">
-              <a:buNone/>
-              <a:defRPr sz="750"/>
+            <a:lvl4pPr marL="4536018" indent="0">
+              <a:buNone/>
+              <a:defRPr sz="3307"/>
             </a:lvl4pPr>
-            <a:lvl5pPr marL="1371600" indent="0">
-              <a:buNone/>
-              <a:defRPr sz="750"/>
+            <a:lvl5pPr marL="6048024" indent="0">
+              <a:buNone/>
+              <a:defRPr sz="3307"/>
             </a:lvl5pPr>
-            <a:lvl6pPr marL="1714500" indent="0">
-              <a:buNone/>
-              <a:defRPr sz="750"/>
+            <a:lvl6pPr marL="7560031" indent="0">
+              <a:buNone/>
+              <a:defRPr sz="3307"/>
             </a:lvl6pPr>
-            <a:lvl7pPr marL="2057400" indent="0">
-              <a:buNone/>
-              <a:defRPr sz="750"/>
+            <a:lvl7pPr marL="9072037" indent="0">
+              <a:buNone/>
+              <a:defRPr sz="3307"/>
             </a:lvl7pPr>
-            <a:lvl8pPr marL="2400300" indent="0">
-              <a:buNone/>
-              <a:defRPr sz="750"/>
+            <a:lvl8pPr marL="10584043" indent="0">
+              <a:buNone/>
+              <a:defRPr sz="3307"/>
             </a:lvl8pPr>
-            <a:lvl9pPr marL="2743200" indent="0">
-              <a:buNone/>
-              <a:defRPr sz="750"/>
+            <a:lvl9pPr marL="12096049" indent="0">
+              <a:buNone/>
+              <a:defRPr sz="3307"/>
             </a:lvl9pPr>
           </a:lstStyle>
           <a:p>
@@ -2385,7 +2390,7 @@
           <a:p>
             <a:fld id="{B8089D90-E8EC-433F-8241-FB36479BB3A8}" type="datetimeFigureOut">
               <a:rPr lang="en-NL" smtClean="0"/>
-              <a:t>05/06/2023</a:t>
+              <a:t>21/06/2023</a:t>
             </a:fld>
             <a:endParaRPr lang="en-NL"/>
           </a:p>
@@ -2436,7 +2441,7 @@
     </p:spTree>
     <p:extLst>
       <p:ext uri="{BB962C8B-B14F-4D97-AF65-F5344CB8AC3E}">
-        <p14:creationId xmlns:p14="http://schemas.microsoft.com/office/powerpoint/2010/main" val="1464001684"/>
+        <p14:creationId xmlns:p14="http://schemas.microsoft.com/office/powerpoint/2010/main" val="783370051"/>
       </p:ext>
     </p:extLst>
   </p:cSld>
@@ -2480,8 +2485,8 @@
         </p:nvSpPr>
         <p:spPr>
           <a:xfrm>
-            <a:off x="471488" y="649114"/>
-            <a:ext cx="5915025" cy="2356556"/>
+            <a:off x="2079020" y="2276970"/>
+            <a:ext cx="26082248" cy="8266358"/>
           </a:xfrm>
           <a:prstGeom prst="rect">
             <a:avLst/>
@@ -2513,8 +2518,8 @@
         </p:nvSpPr>
         <p:spPr>
           <a:xfrm>
-            <a:off x="471488" y="3245556"/>
-            <a:ext cx="5915025" cy="7735712"/>
+            <a:off x="2079020" y="11384800"/>
+            <a:ext cx="26082248" cy="27135427"/>
           </a:xfrm>
           <a:prstGeom prst="rect">
             <a:avLst/>
@@ -2575,8 +2580,8 @@
         </p:nvSpPr>
         <p:spPr>
           <a:xfrm>
-            <a:off x="471488" y="11300181"/>
-            <a:ext cx="1543050" cy="649111"/>
+            <a:off x="2079020" y="39638914"/>
+            <a:ext cx="6804065" cy="2276960"/>
           </a:xfrm>
           <a:prstGeom prst="rect">
             <a:avLst/>
@@ -2586,7 +2591,7 @@
           <a:bodyPr vert="horz" lIns="91440" tIns="45720" rIns="91440" bIns="45720" rtlCol="0" anchor="ctr"/>
           <a:lstStyle>
             <a:lvl1pPr algn="l">
-              <a:defRPr sz="900">
+              <a:defRPr sz="3969">
                 <a:solidFill>
                   <a:schemeClr val="tx1">
                     <a:tint val="75000"/>
@@ -2598,7 +2603,7 @@
           <a:p>
             <a:fld id="{B8089D90-E8EC-433F-8241-FB36479BB3A8}" type="datetimeFigureOut">
               <a:rPr lang="en-NL" smtClean="0"/>
-              <a:t>05/06/2023</a:t>
+              <a:t>21/06/2023</a:t>
             </a:fld>
             <a:endParaRPr lang="en-NL"/>
           </a:p>
@@ -2616,8 +2621,8 @@
         </p:nvSpPr>
         <p:spPr>
           <a:xfrm>
-            <a:off x="2271713" y="11300181"/>
-            <a:ext cx="2314575" cy="649111"/>
+            <a:off x="10017096" y="39638914"/>
+            <a:ext cx="10206097" cy="2276960"/>
           </a:xfrm>
           <a:prstGeom prst="rect">
             <a:avLst/>
@@ -2627,7 +2632,7 @@
           <a:bodyPr vert="horz" lIns="91440" tIns="45720" rIns="91440" bIns="45720" rtlCol="0" anchor="ctr"/>
           <a:lstStyle>
             <a:lvl1pPr algn="ctr">
-              <a:defRPr sz="900">
+              <a:defRPr sz="3969">
                 <a:solidFill>
                   <a:schemeClr val="tx1">
                     <a:tint val="75000"/>
@@ -2653,8 +2658,8 @@
         </p:nvSpPr>
         <p:spPr>
           <a:xfrm>
-            <a:off x="4843463" y="11300181"/>
-            <a:ext cx="1543050" cy="649111"/>
+            <a:off x="21357203" y="39638914"/>
+            <a:ext cx="6804065" cy="2276960"/>
           </a:xfrm>
           <a:prstGeom prst="rect">
             <a:avLst/>
@@ -2664,7 +2669,7 @@
           <a:bodyPr vert="horz" lIns="91440" tIns="45720" rIns="91440" bIns="45720" rtlCol="0" anchor="ctr"/>
           <a:lstStyle>
             <a:lvl1pPr algn="r">
-              <a:defRPr sz="900">
+              <a:defRPr sz="3969">
                 <a:solidFill>
                   <a:schemeClr val="tx1">
                     <a:tint val="75000"/>
@@ -2685,27 +2690,27 @@
     </p:spTree>
     <p:extLst>
       <p:ext uri="{BB962C8B-B14F-4D97-AF65-F5344CB8AC3E}">
-        <p14:creationId xmlns:p14="http://schemas.microsoft.com/office/powerpoint/2010/main" val="2672874512"/>
+        <p14:creationId xmlns:p14="http://schemas.microsoft.com/office/powerpoint/2010/main" val="437960786"/>
       </p:ext>
     </p:extLst>
   </p:cSld>
   <p:clrMap bg1="lt1" tx1="dk1" bg2="lt2" tx2="dk2" accent1="accent1" accent2="accent2" accent3="accent3" accent4="accent4" accent5="accent5" accent6="accent6" hlink="hlink" folHlink="folHlink"/>
   <p:sldLayoutIdLst>
-    <p:sldLayoutId id="2147483661" r:id="rId1"/>
-    <p:sldLayoutId id="2147483662" r:id="rId2"/>
-    <p:sldLayoutId id="2147483663" r:id="rId3"/>
-    <p:sldLayoutId id="2147483664" r:id="rId4"/>
-    <p:sldLayoutId id="2147483665" r:id="rId5"/>
-    <p:sldLayoutId id="2147483666" r:id="rId6"/>
-    <p:sldLayoutId id="2147483667" r:id="rId7"/>
-    <p:sldLayoutId id="2147483668" r:id="rId8"/>
-    <p:sldLayoutId id="2147483669" r:id="rId9"/>
-    <p:sldLayoutId id="2147483670" r:id="rId10"/>
-    <p:sldLayoutId id="2147483671" r:id="rId11"/>
+    <p:sldLayoutId id="2147483685" r:id="rId1"/>
+    <p:sldLayoutId id="2147483686" r:id="rId2"/>
+    <p:sldLayoutId id="2147483687" r:id="rId3"/>
+    <p:sldLayoutId id="2147483688" r:id="rId4"/>
+    <p:sldLayoutId id="2147483689" r:id="rId5"/>
+    <p:sldLayoutId id="2147483690" r:id="rId6"/>
+    <p:sldLayoutId id="2147483691" r:id="rId7"/>
+    <p:sldLayoutId id="2147483692" r:id="rId8"/>
+    <p:sldLayoutId id="2147483693" r:id="rId9"/>
+    <p:sldLayoutId id="2147483694" r:id="rId10"/>
+    <p:sldLayoutId id="2147483695" r:id="rId11"/>
   </p:sldLayoutIdLst>
   <p:txStyles>
     <p:titleStyle>
-      <a:lvl1pPr algn="l" defTabSz="685800" rtl="0" eaLnBrk="1" latinLnBrk="0" hangingPunct="1">
+      <a:lvl1pPr algn="l" defTabSz="3024012" rtl="0" eaLnBrk="1" latinLnBrk="0" hangingPunct="1">
         <a:lnSpc>
           <a:spcPct val="90000"/>
         </a:lnSpc>
@@ -2713,7 +2718,7 @@
           <a:spcPct val="0"/>
         </a:spcBef>
         <a:buNone/>
-        <a:defRPr sz="3300" kern="1200">
+        <a:defRPr sz="14551" kern="1200">
           <a:solidFill>
             <a:schemeClr val="tx1"/>
           </a:solidFill>
@@ -2724,16 +2729,16 @@
       </a:lvl1pPr>
     </p:titleStyle>
     <p:bodyStyle>
-      <a:lvl1pPr marL="171450" indent="-171450" algn="l" defTabSz="685800" rtl="0" eaLnBrk="1" latinLnBrk="0" hangingPunct="1">
+      <a:lvl1pPr marL="756003" indent="-756003" algn="l" defTabSz="3024012" rtl="0" eaLnBrk="1" latinLnBrk="0" hangingPunct="1">
         <a:lnSpc>
           <a:spcPct val="90000"/>
         </a:lnSpc>
         <a:spcBef>
-          <a:spcPts val="750"/>
+          <a:spcPts val="3307"/>
         </a:spcBef>
         <a:buFont typeface="Arial" panose="020B0604020202020204" pitchFamily="34" charset="0"/>
         <a:buChar char="•"/>
-        <a:defRPr sz="2100" kern="1200">
+        <a:defRPr sz="9260" kern="1200">
           <a:solidFill>
             <a:schemeClr val="tx1"/>
           </a:solidFill>
@@ -2742,16 +2747,16 @@
           <a:cs typeface="+mn-cs"/>
         </a:defRPr>
       </a:lvl1pPr>
-      <a:lvl2pPr marL="514350" indent="-171450" algn="l" defTabSz="685800" rtl="0" eaLnBrk="1" latinLnBrk="0" hangingPunct="1">
+      <a:lvl2pPr marL="2268009" indent="-756003" algn="l" defTabSz="3024012" rtl="0" eaLnBrk="1" latinLnBrk="0" hangingPunct="1">
         <a:lnSpc>
           <a:spcPct val="90000"/>
         </a:lnSpc>
         <a:spcBef>
-          <a:spcPts val="375"/>
+          <a:spcPts val="1654"/>
         </a:spcBef>
         <a:buFont typeface="Arial" panose="020B0604020202020204" pitchFamily="34" charset="0"/>
         <a:buChar char="•"/>
-        <a:defRPr sz="1800" kern="1200">
+        <a:defRPr sz="7937" kern="1200">
           <a:solidFill>
             <a:schemeClr val="tx1"/>
           </a:solidFill>
@@ -2760,16 +2765,16 @@
           <a:cs typeface="+mn-cs"/>
         </a:defRPr>
       </a:lvl2pPr>
-      <a:lvl3pPr marL="857250" indent="-171450" algn="l" defTabSz="685800" rtl="0" eaLnBrk="1" latinLnBrk="0" hangingPunct="1">
+      <a:lvl3pPr marL="3780015" indent="-756003" algn="l" defTabSz="3024012" rtl="0" eaLnBrk="1" latinLnBrk="0" hangingPunct="1">
         <a:lnSpc>
           <a:spcPct val="90000"/>
         </a:lnSpc>
         <a:spcBef>
-          <a:spcPts val="375"/>
+          <a:spcPts val="1654"/>
         </a:spcBef>
         <a:buFont typeface="Arial" panose="020B0604020202020204" pitchFamily="34" charset="0"/>
         <a:buChar char="•"/>
-        <a:defRPr sz="1500" kern="1200">
+        <a:defRPr sz="6614" kern="1200">
           <a:solidFill>
             <a:schemeClr val="tx1"/>
           </a:solidFill>
@@ -2778,16 +2783,16 @@
           <a:cs typeface="+mn-cs"/>
         </a:defRPr>
       </a:lvl3pPr>
-      <a:lvl4pPr marL="1200150" indent="-171450" algn="l" defTabSz="685800" rtl="0" eaLnBrk="1" latinLnBrk="0" hangingPunct="1">
+      <a:lvl4pPr marL="5292021" indent="-756003" algn="l" defTabSz="3024012" rtl="0" eaLnBrk="1" latinLnBrk="0" hangingPunct="1">
         <a:lnSpc>
           <a:spcPct val="90000"/>
         </a:lnSpc>
         <a:spcBef>
-          <a:spcPts val="375"/>
+          <a:spcPts val="1654"/>
         </a:spcBef>
         <a:buFont typeface="Arial" panose="020B0604020202020204" pitchFamily="34" charset="0"/>
         <a:buChar char="•"/>
-        <a:defRPr sz="1350" kern="1200">
+        <a:defRPr sz="5953" kern="1200">
           <a:solidFill>
             <a:schemeClr val="tx1"/>
           </a:solidFill>
@@ -2796,16 +2801,16 @@
           <a:cs typeface="+mn-cs"/>
         </a:defRPr>
       </a:lvl4pPr>
-      <a:lvl5pPr marL="1543050" indent="-171450" algn="l" defTabSz="685800" rtl="0" eaLnBrk="1" latinLnBrk="0" hangingPunct="1">
+      <a:lvl5pPr marL="6804028" indent="-756003" algn="l" defTabSz="3024012" rtl="0" eaLnBrk="1" latinLnBrk="0" hangingPunct="1">
         <a:lnSpc>
           <a:spcPct val="90000"/>
         </a:lnSpc>
         <a:spcBef>
-          <a:spcPts val="375"/>
+          <a:spcPts val="1654"/>
         </a:spcBef>
         <a:buFont typeface="Arial" panose="020B0604020202020204" pitchFamily="34" charset="0"/>
         <a:buChar char="•"/>
-        <a:defRPr sz="1350" kern="1200">
+        <a:defRPr sz="5953" kern="1200">
           <a:solidFill>
             <a:schemeClr val="tx1"/>
           </a:solidFill>
@@ -2814,16 +2819,16 @@
           <a:cs typeface="+mn-cs"/>
         </a:defRPr>
       </a:lvl5pPr>
-      <a:lvl6pPr marL="1885950" indent="-171450" algn="l" defTabSz="685800" rtl="0" eaLnBrk="1" latinLnBrk="0" hangingPunct="1">
+      <a:lvl6pPr marL="8316034" indent="-756003" algn="l" defTabSz="3024012" rtl="0" eaLnBrk="1" latinLnBrk="0" hangingPunct="1">
         <a:lnSpc>
           <a:spcPct val="90000"/>
         </a:lnSpc>
         <a:spcBef>
-          <a:spcPts val="375"/>
+          <a:spcPts val="1654"/>
         </a:spcBef>
         <a:buFont typeface="Arial" panose="020B0604020202020204" pitchFamily="34" charset="0"/>
         <a:buChar char="•"/>
-        <a:defRPr sz="1350" kern="1200">
+        <a:defRPr sz="5953" kern="1200">
           <a:solidFill>
             <a:schemeClr val="tx1"/>
           </a:solidFill>
@@ -2832,16 +2837,16 @@
           <a:cs typeface="+mn-cs"/>
         </a:defRPr>
       </a:lvl6pPr>
-      <a:lvl7pPr marL="2228850" indent="-171450" algn="l" defTabSz="685800" rtl="0" eaLnBrk="1" latinLnBrk="0" hangingPunct="1">
+      <a:lvl7pPr marL="9828040" indent="-756003" algn="l" defTabSz="3024012" rtl="0" eaLnBrk="1" latinLnBrk="0" hangingPunct="1">
         <a:lnSpc>
           <a:spcPct val="90000"/>
         </a:lnSpc>
         <a:spcBef>
-          <a:spcPts val="375"/>
+          <a:spcPts val="1654"/>
         </a:spcBef>
         <a:buFont typeface="Arial" panose="020B0604020202020204" pitchFamily="34" charset="0"/>
         <a:buChar char="•"/>
-        <a:defRPr sz="1350" kern="1200">
+        <a:defRPr sz="5953" kern="1200">
           <a:solidFill>
             <a:schemeClr val="tx1"/>
           </a:solidFill>
@@ -2850,16 +2855,16 @@
           <a:cs typeface="+mn-cs"/>
         </a:defRPr>
       </a:lvl7pPr>
-      <a:lvl8pPr marL="2571750" indent="-171450" algn="l" defTabSz="685800" rtl="0" eaLnBrk="1" latinLnBrk="0" hangingPunct="1">
+      <a:lvl8pPr marL="11340046" indent="-756003" algn="l" defTabSz="3024012" rtl="0" eaLnBrk="1" latinLnBrk="0" hangingPunct="1">
         <a:lnSpc>
           <a:spcPct val="90000"/>
         </a:lnSpc>
         <a:spcBef>
-          <a:spcPts val="375"/>
+          <a:spcPts val="1654"/>
         </a:spcBef>
         <a:buFont typeface="Arial" panose="020B0604020202020204" pitchFamily="34" charset="0"/>
         <a:buChar char="•"/>
-        <a:defRPr sz="1350" kern="1200">
+        <a:defRPr sz="5953" kern="1200">
           <a:solidFill>
             <a:schemeClr val="tx1"/>
           </a:solidFill>
@@ -2868,16 +2873,16 @@
           <a:cs typeface="+mn-cs"/>
         </a:defRPr>
       </a:lvl8pPr>
-      <a:lvl9pPr marL="2914650" indent="-171450" algn="l" defTabSz="685800" rtl="0" eaLnBrk="1" latinLnBrk="0" hangingPunct="1">
+      <a:lvl9pPr marL="12852052" indent="-756003" algn="l" defTabSz="3024012" rtl="0" eaLnBrk="1" latinLnBrk="0" hangingPunct="1">
         <a:lnSpc>
           <a:spcPct val="90000"/>
         </a:lnSpc>
         <a:spcBef>
-          <a:spcPts val="375"/>
+          <a:spcPts val="1654"/>
         </a:spcBef>
         <a:buFont typeface="Arial" panose="020B0604020202020204" pitchFamily="34" charset="0"/>
         <a:buChar char="•"/>
-        <a:defRPr sz="1350" kern="1200">
+        <a:defRPr sz="5953" kern="1200">
           <a:solidFill>
             <a:schemeClr val="tx1"/>
           </a:solidFill>
@@ -2891,8 +2896,8 @@
       <a:defPPr>
         <a:defRPr lang="en-US"/>
       </a:defPPr>
-      <a:lvl1pPr marL="0" algn="l" defTabSz="685800" rtl="0" eaLnBrk="1" latinLnBrk="0" hangingPunct="1">
-        <a:defRPr sz="1350" kern="1200">
+      <a:lvl1pPr marL="0" algn="l" defTabSz="3024012" rtl="0" eaLnBrk="1" latinLnBrk="0" hangingPunct="1">
+        <a:defRPr sz="5953" kern="1200">
           <a:solidFill>
             <a:schemeClr val="tx1"/>
           </a:solidFill>
@@ -2901,8 +2906,8 @@
           <a:cs typeface="+mn-cs"/>
         </a:defRPr>
       </a:lvl1pPr>
-      <a:lvl2pPr marL="342900" algn="l" defTabSz="685800" rtl="0" eaLnBrk="1" latinLnBrk="0" hangingPunct="1">
-        <a:defRPr sz="1350" kern="1200">
+      <a:lvl2pPr marL="1512006" algn="l" defTabSz="3024012" rtl="0" eaLnBrk="1" latinLnBrk="0" hangingPunct="1">
+        <a:defRPr sz="5953" kern="1200">
           <a:solidFill>
             <a:schemeClr val="tx1"/>
           </a:solidFill>
@@ -2911,8 +2916,8 @@
           <a:cs typeface="+mn-cs"/>
         </a:defRPr>
       </a:lvl2pPr>
-      <a:lvl3pPr marL="685800" algn="l" defTabSz="685800" rtl="0" eaLnBrk="1" latinLnBrk="0" hangingPunct="1">
-        <a:defRPr sz="1350" kern="1200">
+      <a:lvl3pPr marL="3024012" algn="l" defTabSz="3024012" rtl="0" eaLnBrk="1" latinLnBrk="0" hangingPunct="1">
+        <a:defRPr sz="5953" kern="1200">
           <a:solidFill>
             <a:schemeClr val="tx1"/>
           </a:solidFill>
@@ -2921,8 +2926,8 @@
           <a:cs typeface="+mn-cs"/>
         </a:defRPr>
       </a:lvl3pPr>
-      <a:lvl4pPr marL="1028700" algn="l" defTabSz="685800" rtl="0" eaLnBrk="1" latinLnBrk="0" hangingPunct="1">
-        <a:defRPr sz="1350" kern="1200">
+      <a:lvl4pPr marL="4536018" algn="l" defTabSz="3024012" rtl="0" eaLnBrk="1" latinLnBrk="0" hangingPunct="1">
+        <a:defRPr sz="5953" kern="1200">
           <a:solidFill>
             <a:schemeClr val="tx1"/>
           </a:solidFill>
@@ -2931,8 +2936,8 @@
           <a:cs typeface="+mn-cs"/>
         </a:defRPr>
       </a:lvl4pPr>
-      <a:lvl5pPr marL="1371600" algn="l" defTabSz="685800" rtl="0" eaLnBrk="1" latinLnBrk="0" hangingPunct="1">
-        <a:defRPr sz="1350" kern="1200">
+      <a:lvl5pPr marL="6048024" algn="l" defTabSz="3024012" rtl="0" eaLnBrk="1" latinLnBrk="0" hangingPunct="1">
+        <a:defRPr sz="5953" kern="1200">
           <a:solidFill>
             <a:schemeClr val="tx1"/>
           </a:solidFill>
@@ -2941,8 +2946,8 @@
           <a:cs typeface="+mn-cs"/>
         </a:defRPr>
       </a:lvl5pPr>
-      <a:lvl6pPr marL="1714500" algn="l" defTabSz="685800" rtl="0" eaLnBrk="1" latinLnBrk="0" hangingPunct="1">
-        <a:defRPr sz="1350" kern="1200">
+      <a:lvl6pPr marL="7560031" algn="l" defTabSz="3024012" rtl="0" eaLnBrk="1" latinLnBrk="0" hangingPunct="1">
+        <a:defRPr sz="5953" kern="1200">
           <a:solidFill>
             <a:schemeClr val="tx1"/>
           </a:solidFill>
@@ -2951,8 +2956,8 @@
           <a:cs typeface="+mn-cs"/>
         </a:defRPr>
       </a:lvl6pPr>
-      <a:lvl7pPr marL="2057400" algn="l" defTabSz="685800" rtl="0" eaLnBrk="1" latinLnBrk="0" hangingPunct="1">
-        <a:defRPr sz="1350" kern="1200">
+      <a:lvl7pPr marL="9072037" algn="l" defTabSz="3024012" rtl="0" eaLnBrk="1" latinLnBrk="0" hangingPunct="1">
+        <a:defRPr sz="5953" kern="1200">
           <a:solidFill>
             <a:schemeClr val="tx1"/>
           </a:solidFill>
@@ -2961,8 +2966,8 @@
           <a:cs typeface="+mn-cs"/>
         </a:defRPr>
       </a:lvl7pPr>
-      <a:lvl8pPr marL="2400300" algn="l" defTabSz="685800" rtl="0" eaLnBrk="1" latinLnBrk="0" hangingPunct="1">
-        <a:defRPr sz="1350" kern="1200">
+      <a:lvl8pPr marL="10584043" algn="l" defTabSz="3024012" rtl="0" eaLnBrk="1" latinLnBrk="0" hangingPunct="1">
+        <a:defRPr sz="5953" kern="1200">
           <a:solidFill>
             <a:schemeClr val="tx1"/>
           </a:solidFill>
@@ -2971,8 +2976,8 @@
           <a:cs typeface="+mn-cs"/>
         </a:defRPr>
       </a:lvl8pPr>
-      <a:lvl9pPr marL="2743200" algn="l" defTabSz="685800" rtl="0" eaLnBrk="1" latinLnBrk="0" hangingPunct="1">
-        <a:defRPr sz="1350" kern="1200">
+      <a:lvl9pPr marL="12096049" algn="l" defTabSz="3024012" rtl="0" eaLnBrk="1" latinLnBrk="0" hangingPunct="1">
+        <a:defRPr sz="5953" kern="1200">
           <a:solidFill>
             <a:schemeClr val="tx1"/>
           </a:solidFill>

</xml_diff>

<commit_message>
Tested fonts and picture size
</commit_message>
<xml_diff>
--- a/Poster.pptx
+++ b/Poster.pptx
@@ -115,7 +115,7 @@
 <file path=ppt/revisionInfo.xml><?xml version="1.0" encoding="utf-8"?>
 <p1510:revInfo xmlns:a="http://schemas.openxmlformats.org/drawingml/2006/main" xmlns:r="http://schemas.openxmlformats.org/officeDocument/2006/relationships" xmlns:p1510="http://schemas.microsoft.com/office/powerpoint/2015/10/main">
   <p1510:revLst>
-    <p1510:client id="{5F09D76C-1841-4F58-94B1-5AE3681891B6}" v="2" dt="2023-06-21T10:45:03.964"/>
+    <p1510:client id="{5F09D76C-1841-4F58-94B1-5AE3681891B6}" v="12" dt="2023-06-22T07:54:23.540"/>
   </p1510:revLst>
 </p1510:revInfo>
 </file>
@@ -146,6 +146,126 @@
       </pc:sldChg>
     </pc:docChg>
   </pc:docChgLst>
+  <pc:docChgLst>
+    <pc:chgData name="Emils Zegers" userId="bd5cf22c-0e97-44c0-acad-9bc9915da531" providerId="ADAL" clId="{5F09D76C-1841-4F58-94B1-5AE3681891B6}"/>
+    <pc:docChg chg="custSel modSld">
+      <pc:chgData name="Emils Zegers" userId="bd5cf22c-0e97-44c0-acad-9bc9915da531" providerId="ADAL" clId="{5F09D76C-1841-4F58-94B1-5AE3681891B6}" dt="2023-06-22T07:54:40.095" v="107" actId="14100"/>
+      <pc:docMkLst>
+        <pc:docMk/>
+      </pc:docMkLst>
+      <pc:sldChg chg="addSp delSp modSp mod">
+        <pc:chgData name="Emils Zegers" userId="bd5cf22c-0e97-44c0-acad-9bc9915da531" providerId="ADAL" clId="{5F09D76C-1841-4F58-94B1-5AE3681891B6}" dt="2023-06-22T07:54:40.095" v="107" actId="14100"/>
+        <pc:sldMkLst>
+          <pc:docMk/>
+          <pc:sldMk cId="605312590" sldId="256"/>
+        </pc:sldMkLst>
+        <pc:spChg chg="mod">
+          <ac:chgData name="Emils Zegers" userId="bd5cf22c-0e97-44c0-acad-9bc9915da531" providerId="ADAL" clId="{5F09D76C-1841-4F58-94B1-5AE3681891B6}" dt="2023-06-22T07:41:46.869" v="29" actId="20577"/>
+          <ac:spMkLst>
+            <pc:docMk/>
+            <pc:sldMk cId="605312590" sldId="256"/>
+            <ac:spMk id="2" creationId="{8DB20035-8802-6B91-C2C2-CAEC48AD8007}"/>
+          </ac:spMkLst>
+        </pc:spChg>
+        <pc:spChg chg="del">
+          <ac:chgData name="Emils Zegers" userId="bd5cf22c-0e97-44c0-acad-9bc9915da531" providerId="ADAL" clId="{5F09D76C-1841-4F58-94B1-5AE3681891B6}" dt="2023-06-22T07:45:28.656" v="80" actId="478"/>
+          <ac:spMkLst>
+            <pc:docMk/>
+            <pc:sldMk cId="605312590" sldId="256"/>
+            <ac:spMk id="3" creationId="{190A6092-651D-38CE-CB24-1F58314C8B41}"/>
+          </ac:spMkLst>
+        </pc:spChg>
+        <pc:spChg chg="add mod">
+          <ac:chgData name="Emils Zegers" userId="bd5cf22c-0e97-44c0-acad-9bc9915da531" providerId="ADAL" clId="{5F09D76C-1841-4F58-94B1-5AE3681891B6}" dt="2023-06-22T07:44:59.583" v="70" actId="14100"/>
+          <ac:spMkLst>
+            <pc:docMk/>
+            <pc:sldMk cId="605312590" sldId="256"/>
+            <ac:spMk id="4" creationId="{2102C65A-515F-B2F8-9A1C-38434BCCC427}"/>
+          </ac:spMkLst>
+        </pc:spChg>
+        <pc:spChg chg="add mod">
+          <ac:chgData name="Emils Zegers" userId="bd5cf22c-0e97-44c0-acad-9bc9915da531" providerId="ADAL" clId="{5F09D76C-1841-4F58-94B1-5AE3681891B6}" dt="2023-06-22T07:45:32.128" v="81" actId="1076"/>
+          <ac:spMkLst>
+            <pc:docMk/>
+            <pc:sldMk cId="605312590" sldId="256"/>
+            <ac:spMk id="17" creationId="{0E29FBC8-C102-7BAF-D6A6-070BDC02B058}"/>
+          </ac:spMkLst>
+        </pc:spChg>
+        <pc:picChg chg="add del mod">
+          <ac:chgData name="Emils Zegers" userId="bd5cf22c-0e97-44c0-acad-9bc9915da531" providerId="ADAL" clId="{5F09D76C-1841-4F58-94B1-5AE3681891B6}" dt="2023-06-22T07:43:11.232" v="51" actId="478"/>
+          <ac:picMkLst>
+            <pc:docMk/>
+            <pc:sldMk cId="605312590" sldId="256"/>
+            <ac:picMk id="6" creationId="{3329F5C5-4FC6-CEED-4739-9C5D136832A1}"/>
+          </ac:picMkLst>
+        </pc:picChg>
+        <pc:picChg chg="add del mod">
+          <ac:chgData name="Emils Zegers" userId="bd5cf22c-0e97-44c0-acad-9bc9915da531" providerId="ADAL" clId="{5F09D76C-1841-4F58-94B1-5AE3681891B6}" dt="2023-06-22T07:43:07.973" v="50" actId="478"/>
+          <ac:picMkLst>
+            <pc:docMk/>
+            <pc:sldMk cId="605312590" sldId="256"/>
+            <ac:picMk id="8" creationId="{5915996A-7DBF-AE16-6F31-009034687659}"/>
+          </ac:picMkLst>
+        </pc:picChg>
+        <pc:picChg chg="add del mod">
+          <ac:chgData name="Emils Zegers" userId="bd5cf22c-0e97-44c0-acad-9bc9915da531" providerId="ADAL" clId="{5F09D76C-1841-4F58-94B1-5AE3681891B6}" dt="2023-06-22T07:43:29.986" v="55" actId="478"/>
+          <ac:picMkLst>
+            <pc:docMk/>
+            <pc:sldMk cId="605312590" sldId="256"/>
+            <ac:picMk id="10" creationId="{FBE9281D-8DCB-AC2F-595C-CFBCDC2568E8}"/>
+          </ac:picMkLst>
+        </pc:picChg>
+        <pc:picChg chg="add del mod">
+          <ac:chgData name="Emils Zegers" userId="bd5cf22c-0e97-44c0-acad-9bc9915da531" providerId="ADAL" clId="{5F09D76C-1841-4F58-94B1-5AE3681891B6}" dt="2023-06-22T07:46:04.035" v="88" actId="478"/>
+          <ac:picMkLst>
+            <pc:docMk/>
+            <pc:sldMk cId="605312590" sldId="256"/>
+            <ac:picMk id="12" creationId="{E792BA31-DCDF-BA17-C848-2EC3708A4542}"/>
+          </ac:picMkLst>
+        </pc:picChg>
+        <pc:picChg chg="add del mod">
+          <ac:chgData name="Emils Zegers" userId="bd5cf22c-0e97-44c0-acad-9bc9915da531" providerId="ADAL" clId="{5F09D76C-1841-4F58-94B1-5AE3681891B6}" dt="2023-06-22T07:51:13.795" v="89" actId="478"/>
+          <ac:picMkLst>
+            <pc:docMk/>
+            <pc:sldMk cId="605312590" sldId="256"/>
+            <ac:picMk id="14" creationId="{7BA47201-6687-80DB-2572-D136598F8B58}"/>
+          </ac:picMkLst>
+        </pc:picChg>
+        <pc:picChg chg="add mod">
+          <ac:chgData name="Emils Zegers" userId="bd5cf22c-0e97-44c0-acad-9bc9915da531" providerId="ADAL" clId="{5F09D76C-1841-4F58-94B1-5AE3681891B6}" dt="2023-06-22T07:44:28.619" v="68" actId="14100"/>
+          <ac:picMkLst>
+            <pc:docMk/>
+            <pc:sldMk cId="605312590" sldId="256"/>
+            <ac:picMk id="16" creationId="{3F43A4C1-1D86-8FD2-2B51-016091922B6A}"/>
+          </ac:picMkLst>
+        </pc:picChg>
+        <pc:picChg chg="add del mod">
+          <ac:chgData name="Emils Zegers" userId="bd5cf22c-0e97-44c0-acad-9bc9915da531" providerId="ADAL" clId="{5F09D76C-1841-4F58-94B1-5AE3681891B6}" dt="2023-06-22T07:51:59.418" v="97" actId="478"/>
+          <ac:picMkLst>
+            <pc:docMk/>
+            <pc:sldMk cId="605312590" sldId="256"/>
+            <ac:picMk id="19" creationId="{4C319455-BE5E-D6A1-1891-8CA0C1AEFFFD}"/>
+          </ac:picMkLst>
+        </pc:picChg>
+        <pc:picChg chg="add del mod">
+          <ac:chgData name="Emils Zegers" userId="bd5cf22c-0e97-44c0-acad-9bc9915da531" providerId="ADAL" clId="{5F09D76C-1841-4F58-94B1-5AE3681891B6}" dt="2023-06-22T07:54:18.396" v="101" actId="478"/>
+          <ac:picMkLst>
+            <pc:docMk/>
+            <pc:sldMk cId="605312590" sldId="256"/>
+            <ac:picMk id="21" creationId="{0C2C2998-CE4B-C8EC-EA0A-40889C447CAE}"/>
+          </ac:picMkLst>
+        </pc:picChg>
+        <pc:picChg chg="add mod">
+          <ac:chgData name="Emils Zegers" userId="bd5cf22c-0e97-44c0-acad-9bc9915da531" providerId="ADAL" clId="{5F09D76C-1841-4F58-94B1-5AE3681891B6}" dt="2023-06-22T07:54:40.095" v="107" actId="14100"/>
+          <ac:picMkLst>
+            <pc:docMk/>
+            <pc:sldMk cId="605312590" sldId="256"/>
+            <ac:picMk id="23" creationId="{098999BF-B894-6B99-397A-E1BB84087883}"/>
+          </ac:picMkLst>
+        </pc:picChg>
+      </pc:sldChg>
+    </pc:docChg>
+  </pc:docChgLst>
 </pc:chgInfo>
 </file>
 
@@ -280,7 +400,7 @@
           <a:p>
             <a:fld id="{B8089D90-E8EC-433F-8241-FB36479BB3A8}" type="datetimeFigureOut">
               <a:rPr lang="en-NL" smtClean="0"/>
-              <a:t>21/06/2023</a:t>
+              <a:t>22/06/2023</a:t>
             </a:fld>
             <a:endParaRPr lang="en-NL"/>
           </a:p>
@@ -450,7 +570,7 @@
           <a:p>
             <a:fld id="{B8089D90-E8EC-433F-8241-FB36479BB3A8}" type="datetimeFigureOut">
               <a:rPr lang="en-NL" smtClean="0"/>
-              <a:t>21/06/2023</a:t>
+              <a:t>22/06/2023</a:t>
             </a:fld>
             <a:endParaRPr lang="en-NL"/>
           </a:p>
@@ -630,7 +750,7 @@
           <a:p>
             <a:fld id="{B8089D90-E8EC-433F-8241-FB36479BB3A8}" type="datetimeFigureOut">
               <a:rPr lang="en-NL" smtClean="0"/>
-              <a:t>21/06/2023</a:t>
+              <a:t>22/06/2023</a:t>
             </a:fld>
             <a:endParaRPr lang="en-NL"/>
           </a:p>
@@ -800,7 +920,7 @@
           <a:p>
             <a:fld id="{B8089D90-E8EC-433F-8241-FB36479BB3A8}" type="datetimeFigureOut">
               <a:rPr lang="en-NL" smtClean="0"/>
-              <a:t>21/06/2023</a:t>
+              <a:t>22/06/2023</a:t>
             </a:fld>
             <a:endParaRPr lang="en-NL"/>
           </a:p>
@@ -1044,7 +1164,7 @@
           <a:p>
             <a:fld id="{B8089D90-E8EC-433F-8241-FB36479BB3A8}" type="datetimeFigureOut">
               <a:rPr lang="en-NL" smtClean="0"/>
-              <a:t>21/06/2023</a:t>
+              <a:t>22/06/2023</a:t>
             </a:fld>
             <a:endParaRPr lang="en-NL"/>
           </a:p>
@@ -1276,7 +1396,7 @@
           <a:p>
             <a:fld id="{B8089D90-E8EC-433F-8241-FB36479BB3A8}" type="datetimeFigureOut">
               <a:rPr lang="en-NL" smtClean="0"/>
-              <a:t>21/06/2023</a:t>
+              <a:t>22/06/2023</a:t>
             </a:fld>
             <a:endParaRPr lang="en-NL"/>
           </a:p>
@@ -1643,7 +1763,7 @@
           <a:p>
             <a:fld id="{B8089D90-E8EC-433F-8241-FB36479BB3A8}" type="datetimeFigureOut">
               <a:rPr lang="en-NL" smtClean="0"/>
-              <a:t>21/06/2023</a:t>
+              <a:t>22/06/2023</a:t>
             </a:fld>
             <a:endParaRPr lang="en-NL"/>
           </a:p>
@@ -1761,7 +1881,7 @@
           <a:p>
             <a:fld id="{B8089D90-E8EC-433F-8241-FB36479BB3A8}" type="datetimeFigureOut">
               <a:rPr lang="en-NL" smtClean="0"/>
-              <a:t>21/06/2023</a:t>
+              <a:t>22/06/2023</a:t>
             </a:fld>
             <a:endParaRPr lang="en-NL"/>
           </a:p>
@@ -1856,7 +1976,7 @@
           <a:p>
             <a:fld id="{B8089D90-E8EC-433F-8241-FB36479BB3A8}" type="datetimeFigureOut">
               <a:rPr lang="en-NL" smtClean="0"/>
-              <a:t>21/06/2023</a:t>
+              <a:t>22/06/2023</a:t>
             </a:fld>
             <a:endParaRPr lang="en-NL"/>
           </a:p>
@@ -2133,7 +2253,7 @@
           <a:p>
             <a:fld id="{B8089D90-E8EC-433F-8241-FB36479BB3A8}" type="datetimeFigureOut">
               <a:rPr lang="en-NL" smtClean="0"/>
-              <a:t>21/06/2023</a:t>
+              <a:t>22/06/2023</a:t>
             </a:fld>
             <a:endParaRPr lang="en-NL"/>
           </a:p>
@@ -2390,7 +2510,7 @@
           <a:p>
             <a:fld id="{B8089D90-E8EC-433F-8241-FB36479BB3A8}" type="datetimeFigureOut">
               <a:rPr lang="en-NL" smtClean="0"/>
-              <a:t>21/06/2023</a:t>
+              <a:t>22/06/2023</a:t>
             </a:fld>
             <a:endParaRPr lang="en-NL"/>
           </a:p>
@@ -2603,7 +2723,7 @@
           <a:p>
             <a:fld id="{B8089D90-E8EC-433F-8241-FB36479BB3A8}" type="datetimeFigureOut">
               <a:rPr lang="en-NL" smtClean="0"/>
-              <a:t>21/06/2023</a:t>
+              <a:t>22/06/2023</a:t>
             </a:fld>
             <a:endParaRPr lang="en-NL"/>
           </a:p>
@@ -3024,44 +3144,187 @@
             <p:ph type="ctrTitle"/>
           </p:nvPr>
         </p:nvSpPr>
-        <p:spPr/>
-        <p:txBody>
-          <a:bodyPr/>
-          <a:lstStyle/>
-          <a:p>
-            <a:r>
-              <a:rPr lang="en-US"/>
-              <a:t>Test</a:t>
-            </a:r>
-            <a:endParaRPr lang="en-NL"/>
-          </a:p>
-        </p:txBody>
-      </p:sp>
-      <p:sp>
-        <p:nvSpPr>
-          <p:cNvPr id="3" name="Subtitle 2">
+        <p:spPr>
+          <a:xfrm>
+            <a:off x="2268021" y="544592"/>
+            <a:ext cx="25704245" cy="2979845"/>
+          </a:xfrm>
+        </p:spPr>
+        <p:txBody>
+          <a:bodyPr/>
+          <a:lstStyle/>
+          <a:p>
+            <a:r>
+              <a:rPr lang="en-US" dirty="0"/>
+              <a:t>Optical Feedback</a:t>
+            </a:r>
+            <a:endParaRPr lang="en-NL" dirty="0"/>
+          </a:p>
+        </p:txBody>
+      </p:sp>
+      <p:sp>
+        <p:nvSpPr>
+          <p:cNvPr id="4" name="TextBox 3">
             <a:extLst>
               <a:ext uri="{FF2B5EF4-FFF2-40B4-BE49-F238E27FC236}">
-                <a16:creationId xmlns:a16="http://schemas.microsoft.com/office/drawing/2014/main" id="{190A6092-651D-38CE-CB24-1F58314C8B41}"/>
+                <a16:creationId xmlns:a16="http://schemas.microsoft.com/office/drawing/2014/main" id="{2102C65A-515F-B2F8-9A1C-38434BCCC427}"/>
               </a:ext>
             </a:extLst>
           </p:cNvPr>
-          <p:cNvSpPr>
-            <a:spLocks noGrp="1"/>
-          </p:cNvSpPr>
-          <p:nvPr>
-            <p:ph type="subTitle" idx="1"/>
-          </p:nvPr>
-        </p:nvSpPr>
-        <p:spPr/>
-        <p:txBody>
-          <a:bodyPr/>
-          <a:lstStyle/>
-          <a:p>
-            <a:endParaRPr lang="en-NL"/>
-          </a:p>
-        </p:txBody>
-      </p:sp>
+          <p:cNvSpPr txBox="1"/>
+          <p:nvPr/>
+        </p:nvSpPr>
+        <p:spPr>
+          <a:xfrm>
+            <a:off x="2268021" y="5514603"/>
+            <a:ext cx="9672967" cy="5632311"/>
+          </a:xfrm>
+          <a:prstGeom prst="rect">
+            <a:avLst/>
+          </a:prstGeom>
+          <a:noFill/>
+        </p:spPr>
+        <p:txBody>
+          <a:bodyPr wrap="square" rtlCol="0">
+            <a:spAutoFit/>
+          </a:bodyPr>
+          <a:lstStyle/>
+          <a:p>
+            <a:pPr algn="just"/>
+            <a:r>
+              <a:rPr lang="en-GB" sz="4000" b="0" i="0" u="none" strike="noStrike" dirty="0">
+                <a:solidFill>
+                  <a:srgbClr val="000000"/>
+                </a:solidFill>
+                <a:effectLst/>
+                <a:latin typeface="Arial" panose="020B0604020202020204" pitchFamily="34" charset="0"/>
+              </a:rPr>
+              <a:t>For this project we built our own external cavity diode laser (ECDL) and Czerny-Turner Spectrometer, to measure the effects that optical feedback has on the output of a diode laser. The output of the ECDL was used as an input for the spectrometer, which visualized our results using an oscilloscope and a CCD we programmed.</a:t>
+            </a:r>
+            <a:endParaRPr lang="en-NL" sz="4000" dirty="0"/>
+          </a:p>
+        </p:txBody>
+      </p:sp>
+      <p:pic>
+        <p:nvPicPr>
+          <p:cNvPr id="16" name="Graphic 15">
+            <a:extLst>
+              <a:ext uri="{FF2B5EF4-FFF2-40B4-BE49-F238E27FC236}">
+                <a16:creationId xmlns:a16="http://schemas.microsoft.com/office/drawing/2014/main" id="{3F43A4C1-1D86-8FD2-2B51-016091922B6A}"/>
+              </a:ext>
+            </a:extLst>
+          </p:cNvPr>
+          <p:cNvPicPr>
+            <a:picLocks noChangeAspect="1"/>
+          </p:cNvPicPr>
+          <p:nvPr/>
+        </p:nvPicPr>
+        <p:blipFill>
+          <a:blip r:embed="rId2">
+            <a:extLst>
+              <a:ext uri="{28A0092B-C50C-407E-A947-70E740481C1C}">
+                <a14:useLocalDpi xmlns:a14="http://schemas.microsoft.com/office/drawing/2010/main" val="0"/>
+              </a:ext>
+              <a:ext uri="{96DAC541-7B7A-43D3-8B79-37D633B846F1}">
+                <asvg:svgBlip xmlns:asvg="http://schemas.microsoft.com/office/drawing/2016/SVG/main" r:embed="rId3"/>
+              </a:ext>
+            </a:extLst>
+          </a:blip>
+          <a:stretch>
+            <a:fillRect/>
+          </a:stretch>
+        </p:blipFill>
+        <p:spPr>
+          <a:xfrm>
+            <a:off x="11376490" y="4453311"/>
+            <a:ext cx="14021751" cy="10485525"/>
+          </a:xfrm>
+          <a:prstGeom prst="rect">
+            <a:avLst/>
+          </a:prstGeom>
+        </p:spPr>
+      </p:pic>
+      <p:sp>
+        <p:nvSpPr>
+          <p:cNvPr id="17" name="TextBox 16">
+            <a:extLst>
+              <a:ext uri="{FF2B5EF4-FFF2-40B4-BE49-F238E27FC236}">
+                <a16:creationId xmlns:a16="http://schemas.microsoft.com/office/drawing/2014/main" id="{0E29FBC8-C102-7BAF-D6A6-070BDC02B058}"/>
+              </a:ext>
+            </a:extLst>
+          </p:cNvPr>
+          <p:cNvSpPr txBox="1"/>
+          <p:nvPr/>
+        </p:nvSpPr>
+        <p:spPr>
+          <a:xfrm>
+            <a:off x="2232472" y="25656987"/>
+            <a:ext cx="6852045" cy="5632311"/>
+          </a:xfrm>
+          <a:prstGeom prst="rect">
+            <a:avLst/>
+          </a:prstGeom>
+          <a:noFill/>
+        </p:spPr>
+        <p:txBody>
+          <a:bodyPr wrap="square" rtlCol="0">
+            <a:spAutoFit/>
+          </a:bodyPr>
+          <a:lstStyle/>
+          <a:p>
+            <a:r>
+              <a:rPr lang="en-GB" sz="4000" b="0" i="0" u="none" strike="noStrike" dirty="0">
+                <a:solidFill>
+                  <a:srgbClr val="000000"/>
+                </a:solidFill>
+                <a:effectLst/>
+                <a:latin typeface="Arial" panose="020B0604020202020204" pitchFamily="34" charset="0"/>
+              </a:rPr>
+              <a:t>A diode laser emits light by sending electrons through a semiconductor-type material. This material lets excited electrons deexcite through an energy gap making them emit light with the wavelength of the energy that’s around or higher than the energy gap.</a:t>
+            </a:r>
+            <a:endParaRPr lang="en-NL" sz="4000" dirty="0"/>
+          </a:p>
+        </p:txBody>
+      </p:sp>
+      <p:pic>
+        <p:nvPicPr>
+          <p:cNvPr id="23" name="Graphic 22">
+            <a:extLst>
+              <a:ext uri="{FF2B5EF4-FFF2-40B4-BE49-F238E27FC236}">
+                <a16:creationId xmlns:a16="http://schemas.microsoft.com/office/drawing/2014/main" id="{098999BF-B894-6B99-397A-E1BB84087883}"/>
+              </a:ext>
+            </a:extLst>
+          </p:cNvPr>
+          <p:cNvPicPr>
+            <a:picLocks noChangeAspect="1"/>
+          </p:cNvPicPr>
+          <p:nvPr/>
+        </p:nvPicPr>
+        <p:blipFill>
+          <a:blip r:embed="rId4">
+            <a:extLst>
+              <a:ext uri="{28A0092B-C50C-407E-A947-70E740481C1C}">
+                <a14:useLocalDpi xmlns:a14="http://schemas.microsoft.com/office/drawing/2010/main" val="0"/>
+              </a:ext>
+              <a:ext uri="{96DAC541-7B7A-43D3-8B79-37D633B846F1}">
+                <asvg:svgBlip xmlns:asvg="http://schemas.microsoft.com/office/drawing/2016/SVG/main" r:embed="rId5"/>
+              </a:ext>
+            </a:extLst>
+          </a:blip>
+          <a:stretch>
+            <a:fillRect/>
+          </a:stretch>
+        </p:blipFill>
+        <p:spPr>
+          <a:xfrm>
+            <a:off x="12224544" y="13836491"/>
+            <a:ext cx="15747722" cy="9947434"/>
+          </a:xfrm>
+          <a:prstGeom prst="rect">
+            <a:avLst/>
+          </a:prstGeom>
+        </p:spPr>
+      </p:pic>
     </p:spTree>
     <p:extLst>
       <p:ext uri="{BB962C8B-B14F-4D97-AF65-F5344CB8AC3E}">

</xml_diff>